<commit_message>
trying to get jenkins to work
</commit_message>
<xml_diff>
--- a/documents/Presentation - Outline.pptx
+++ b/documents/Presentation - Outline.pptx
@@ -3305,8 +3305,8 @@
         <a:lstStyle/>
         <a:p>
           <a:r>
-            <a:rPr lang="en-US"/>
-            <a:t>ETL </a:t>
+            <a:rPr lang="en-US" dirty="0"/>
+            <a:t>De-normalized data </a:t>
           </a:r>
         </a:p>
       </dgm:t>
@@ -5515,8 +5515,8 @@
             <a:buNone/>
           </a:pPr>
           <a:r>
-            <a:rPr lang="en-US" sz="1900" kern="1200"/>
-            <a:t>ETL </a:t>
+            <a:rPr lang="en-US" sz="1900" kern="1200" dirty="0"/>
+            <a:t>De-normalized data </a:t>
           </a:r>
         </a:p>
       </dsp:txBody>
@@ -9865,7 +9865,7 @@
           <a:p>
             <a:fld id="{EAF96A45-B343-3347-9C02-FFA9E6833477}" type="datetimeFigureOut">
               <a:rPr lang="en-US" smtClean="0"/>
-              <a:t>2/20/21</a:t>
+              <a:t>2/21/21</a:t>
             </a:fld>
             <a:endParaRPr lang="en-US"/>
           </a:p>
@@ -10712,7 +10712,7 @@
           <a:p>
             <a:fld id="{A8056D83-F6B7-7E40-BA5A-76C96C6D033C}" type="datetimeFigureOut">
               <a:rPr lang="en-US" smtClean="0"/>
-              <a:t>2/20/21</a:t>
+              <a:t>2/21/21</a:t>
             </a:fld>
             <a:endParaRPr lang="en-US"/>
           </a:p>
@@ -10910,7 +10910,7 @@
           <a:p>
             <a:fld id="{A8056D83-F6B7-7E40-BA5A-76C96C6D033C}" type="datetimeFigureOut">
               <a:rPr lang="en-US" smtClean="0"/>
-              <a:t>2/20/21</a:t>
+              <a:t>2/21/21</a:t>
             </a:fld>
             <a:endParaRPr lang="en-US"/>
           </a:p>
@@ -11118,7 +11118,7 @@
           <a:p>
             <a:fld id="{A8056D83-F6B7-7E40-BA5A-76C96C6D033C}" type="datetimeFigureOut">
               <a:rPr lang="en-US" smtClean="0"/>
-              <a:t>2/20/21</a:t>
+              <a:t>2/21/21</a:t>
             </a:fld>
             <a:endParaRPr lang="en-US"/>
           </a:p>
@@ -11316,7 +11316,7 @@
           <a:p>
             <a:fld id="{A8056D83-F6B7-7E40-BA5A-76C96C6D033C}" type="datetimeFigureOut">
               <a:rPr lang="en-US" smtClean="0"/>
-              <a:t>2/20/21</a:t>
+              <a:t>2/21/21</a:t>
             </a:fld>
             <a:endParaRPr lang="en-US"/>
           </a:p>
@@ -11591,7 +11591,7 @@
           <a:p>
             <a:fld id="{A8056D83-F6B7-7E40-BA5A-76C96C6D033C}" type="datetimeFigureOut">
               <a:rPr lang="en-US" smtClean="0"/>
-              <a:t>2/20/21</a:t>
+              <a:t>2/21/21</a:t>
             </a:fld>
             <a:endParaRPr lang="en-US"/>
           </a:p>
@@ -11856,7 +11856,7 @@
           <a:p>
             <a:fld id="{A8056D83-F6B7-7E40-BA5A-76C96C6D033C}" type="datetimeFigureOut">
               <a:rPr lang="en-US" smtClean="0"/>
-              <a:t>2/20/21</a:t>
+              <a:t>2/21/21</a:t>
             </a:fld>
             <a:endParaRPr lang="en-US"/>
           </a:p>
@@ -12268,7 +12268,7 @@
           <a:p>
             <a:fld id="{A8056D83-F6B7-7E40-BA5A-76C96C6D033C}" type="datetimeFigureOut">
               <a:rPr lang="en-US" smtClean="0"/>
-              <a:t>2/20/21</a:t>
+              <a:t>2/21/21</a:t>
             </a:fld>
             <a:endParaRPr lang="en-US"/>
           </a:p>
@@ -12409,7 +12409,7 @@
           <a:p>
             <a:fld id="{A8056D83-F6B7-7E40-BA5A-76C96C6D033C}" type="datetimeFigureOut">
               <a:rPr lang="en-US" smtClean="0"/>
-              <a:t>2/20/21</a:t>
+              <a:t>2/21/21</a:t>
             </a:fld>
             <a:endParaRPr lang="en-US"/>
           </a:p>
@@ -12522,7 +12522,7 @@
           <a:p>
             <a:fld id="{A8056D83-F6B7-7E40-BA5A-76C96C6D033C}" type="datetimeFigureOut">
               <a:rPr lang="en-US" smtClean="0"/>
-              <a:t>2/20/21</a:t>
+              <a:t>2/21/21</a:t>
             </a:fld>
             <a:endParaRPr lang="en-US"/>
           </a:p>
@@ -12833,7 +12833,7 @@
           <a:p>
             <a:fld id="{A8056D83-F6B7-7E40-BA5A-76C96C6D033C}" type="datetimeFigureOut">
               <a:rPr lang="en-US" smtClean="0"/>
-              <a:t>2/20/21</a:t>
+              <a:t>2/21/21</a:t>
             </a:fld>
             <a:endParaRPr lang="en-US"/>
           </a:p>
@@ -13121,7 +13121,7 @@
           <a:p>
             <a:fld id="{A8056D83-F6B7-7E40-BA5A-76C96C6D033C}" type="datetimeFigureOut">
               <a:rPr lang="en-US" smtClean="0"/>
-              <a:t>2/20/21</a:t>
+              <a:t>2/21/21</a:t>
             </a:fld>
             <a:endParaRPr lang="en-US"/>
           </a:p>
@@ -13362,7 +13362,7 @@
           <a:p>
             <a:fld id="{A8056D83-F6B7-7E40-BA5A-76C96C6D033C}" type="datetimeFigureOut">
               <a:rPr lang="en-US" smtClean="0"/>
-              <a:t>2/20/21</a:t>
+              <a:t>2/21/21</a:t>
             </a:fld>
             <a:endParaRPr lang="en-US"/>
           </a:p>
@@ -20536,7 +20536,7 @@
             <p:ph idx="1"/>
             <p:extLst>
               <p:ext uri="{D42A27DB-BD31-4B8C-83A1-F6EECF244321}">
-                <p14:modId xmlns:p14="http://schemas.microsoft.com/office/powerpoint/2010/main" val="1445318660"/>
+                <p14:modId xmlns:p14="http://schemas.microsoft.com/office/powerpoint/2010/main" val="932048012"/>
               </p:ext>
             </p:extLst>
           </p:nvPr>

</xml_diff>